<commit_message>
Made base for website from plan Started the simulation in canvas
</commit_message>
<xml_diff>
--- a/dev/site_plan.pptx
+++ b/dev/site_plan.pptx
@@ -3746,11 +3746,7 @@
           <a:p>
             <a:r>
               <a:rPr lang="fr-CA" dirty="0" smtClean="0"/>
-              <a:t>L  </a:t>
-            </a:r>
-            <a:r>
-              <a:rPr lang="fr-CA" dirty="0" smtClean="0"/>
-              <a:t>[              ]</a:t>
+              <a:t>L  [              ]</a:t>
             </a:r>
           </a:p>
           <a:p>

</xml_diff>